<commit_message>
updated schedule sem32 times ass
</commit_message>
<xml_diff>
--- a/unit-1-sem-3/calendar.pptx
+++ b/unit-1-sem-3/calendar.pptx
@@ -5,10 +5,12 @@
     <p:sldMasterId id="2147483648" r:id="rId1"/>
   </p:sldMasterIdLst>
   <p:notesMasterIdLst>
-    <p:notesMasterId r:id="rId3"/>
+    <p:notesMasterId r:id="rId5"/>
   </p:notesMasterIdLst>
   <p:sldIdLst>
     <p:sldId id="259" r:id="rId2"/>
+    <p:sldId id="257" r:id="rId3"/>
+    <p:sldId id="258" r:id="rId4"/>
   </p:sldIdLst>
   <p:sldSz cx="24384000" cy="13716000"/>
   <p:notesSz cx="7104063" cy="10234613"/>
@@ -1654,6 +1656,137 @@
 </p:sldLayout>
 </file>
 
+<file path=ppt/slideLayouts/slideLayout16.xml><?xml version="1.0" encoding="utf-8"?>
+<p:sldLayout xmlns:a="http://schemas.openxmlformats.org/drawingml/2006/main" xmlns:r="http://schemas.openxmlformats.org/officeDocument/2006/relationships" xmlns:p="http://schemas.openxmlformats.org/presentationml/2006/main" type="tx">
+  <p:cSld name="1_Title &amp; Bullets">
+    <p:spTree>
+      <p:nvGrpSpPr>
+        <p:cNvPr id="1" name=""/>
+        <p:cNvGrpSpPr/>
+        <p:nvPr/>
+      </p:nvGrpSpPr>
+      <p:grpSpPr>
+        <a:xfrm>
+          <a:off x="0" y="0"/>
+          <a:ext cx="0" cy="0"/>
+          <a:chOff x="0" y="0"/>
+          <a:chExt cx="0" cy="0"/>
+        </a:xfrm>
+      </p:grpSpPr>
+      <p:sp>
+        <p:nvSpPr>
+          <p:cNvPr id="149" name="Title Text"/>
+          <p:cNvSpPr txBox="1">
+            <a:spLocks noGrp="1"/>
+          </p:cNvSpPr>
+          <p:nvPr>
+            <p:ph type="title"/>
+          </p:nvPr>
+        </p:nvSpPr>
+        <p:spPr>
+          <a:prstGeom prst="rect">
+            <a:avLst/>
+          </a:prstGeom>
+        </p:spPr>
+        <p:txBody>
+          <a:bodyPr/>
+          <a:lstStyle/>
+          <a:p>
+            <a:r>
+              <a:t>Title Text</a:t>
+            </a:r>
+          </a:p>
+        </p:txBody>
+      </p:sp>
+      <p:sp>
+        <p:nvSpPr>
+          <p:cNvPr id="150" name="Body Level One…"/>
+          <p:cNvSpPr txBox="1">
+            <a:spLocks noGrp="1"/>
+          </p:cNvSpPr>
+          <p:nvPr>
+            <p:ph type="body" idx="1"/>
+          </p:nvPr>
+        </p:nvSpPr>
+        <p:spPr>
+          <a:prstGeom prst="rect">
+            <a:avLst/>
+          </a:prstGeom>
+        </p:spPr>
+        <p:txBody>
+          <a:bodyPr/>
+          <a:lstStyle/>
+          <a:p>
+            <a:r>
+              <a:t>Body Level One</a:t>
+            </a:r>
+          </a:p>
+          <a:p>
+            <a:pPr lvl="1"/>
+            <a:r>
+              <a:t>Body Level Two</a:t>
+            </a:r>
+          </a:p>
+          <a:p>
+            <a:pPr lvl="2"/>
+            <a:r>
+              <a:t>Body Level Three</a:t>
+            </a:r>
+          </a:p>
+          <a:p>
+            <a:pPr lvl="3"/>
+            <a:r>
+              <a:t>Body Level Four</a:t>
+            </a:r>
+          </a:p>
+          <a:p>
+            <a:pPr lvl="4"/>
+            <a:r>
+              <a:t>Body Level Five</a:t>
+            </a:r>
+          </a:p>
+        </p:txBody>
+      </p:sp>
+      <p:sp>
+        <p:nvSpPr>
+          <p:cNvPr id="151" name="01"/>
+          <p:cNvSpPr txBox="1">
+            <a:spLocks noGrp="1"/>
+          </p:cNvSpPr>
+          <p:nvPr>
+            <p:ph type="sldNum" sz="quarter" idx="2"/>
+          </p:nvPr>
+        </p:nvSpPr>
+        <p:spPr>
+          <a:prstGeom prst="rect">
+            <a:avLst/>
+          </a:prstGeom>
+        </p:spPr>
+        <p:txBody>
+          <a:bodyPr/>
+          <a:lstStyle/>
+          <a:p>
+            <a:fld id="{86CB4B4D-7CA3-9044-876B-883B54F8677D}" type="slidenum">
+              <a:t>‹#›</a:t>
+            </a:fld>
+            <a:endParaRPr/>
+          </a:p>
+        </p:txBody>
+      </p:sp>
+    </p:spTree>
+    <p:extLst>
+      <p:ext uri="{BB962C8B-B14F-4D97-AF65-F5344CB8AC3E}">
+        <p14:creationId xmlns:p14="http://schemas.microsoft.com/office/powerpoint/2010/main" val="716803781"/>
+      </p:ext>
+    </p:extLst>
+  </p:cSld>
+  <p:clrMapOvr>
+    <a:masterClrMapping/>
+  </p:clrMapOvr>
+  <p:transition spd="med"/>
+</p:sldLayout>
+</file>
+
 <file path=ppt/slideLayouts/slideLayout2.xml><?xml version="1.0" encoding="utf-8"?>
 <p:sldLayout xmlns:a="http://schemas.openxmlformats.org/drawingml/2006/main" xmlns:r="http://schemas.openxmlformats.org/officeDocument/2006/relationships" xmlns:p="http://schemas.openxmlformats.org/presentationml/2006/main" type="tx">
   <p:cSld name="Title &amp; Photo">
@@ -3322,7 +3455,7 @@
           </a:ln>
           <a:extLst>
             <a:ext uri="{C572A759-6A51-4108-AA02-DFA0A04FC94B}">
-              <ma14:wrappingTextBoxFlag xmlns:ma14="http://schemas.microsoft.com/office/mac/drawingml/2011/main" xmlns:a14="http://schemas.microsoft.com/office/drawing/2010/main" xmlns:m="http://schemas.openxmlformats.org/officeDocument/2006/math" xmlns="" val="1"/>
+              <ma14:wrappingTextBoxFlag xmlns="" xmlns:m="http://schemas.openxmlformats.org/officeDocument/2006/math" xmlns:a14="http://schemas.microsoft.com/office/drawing/2010/main" xmlns:ma14="http://schemas.microsoft.com/office/mac/drawingml/2011/main" val="1"/>
             </a:ext>
           </a:extLst>
         </p:spPr>
@@ -3359,7 +3492,7 @@
           </a:ln>
           <a:extLst>
             <a:ext uri="{C572A759-6A51-4108-AA02-DFA0A04FC94B}">
-              <ma14:wrappingTextBoxFlag xmlns:ma14="http://schemas.microsoft.com/office/mac/drawingml/2011/main" xmlns:a14="http://schemas.microsoft.com/office/drawing/2010/main" xmlns:m="http://schemas.openxmlformats.org/officeDocument/2006/math" xmlns="" val="1"/>
+              <ma14:wrappingTextBoxFlag xmlns="" xmlns:m="http://schemas.openxmlformats.org/officeDocument/2006/math" xmlns:a14="http://schemas.microsoft.com/office/drawing/2010/main" xmlns:ma14="http://schemas.microsoft.com/office/mac/drawingml/2011/main" val="1"/>
             </a:ext>
           </a:extLst>
         </p:spPr>
@@ -3459,6 +3592,7 @@
     <p:sldLayoutId id="2147483661" r:id="rId13"/>
     <p:sldLayoutId id="2147483662" r:id="rId14"/>
     <p:sldLayoutId id="2147483663" r:id="rId15"/>
+    <p:sldLayoutId id="2147483664" r:id="rId16"/>
   </p:sldLayoutIdLst>
   <p:transition spd="med"/>
   <p:txStyles>
@@ -4197,101 +4331,6 @@
           <a:chExt cx="0" cy="0"/>
         </a:xfrm>
       </p:grpSpPr>
-      <p:pic>
-        <p:nvPicPr>
-          <p:cNvPr id="3" name="Picture 2" descr="A calendar with numbers and a number on it&#10;&#10;Description automatically generated">
-            <a:extLst>
-              <a:ext uri="{FF2B5EF4-FFF2-40B4-BE49-F238E27FC236}">
-                <a16:creationId xmlns:a16="http://schemas.microsoft.com/office/drawing/2014/main" id="{5FB8C40F-C080-481A-035A-B32CBC7F121D}"/>
-              </a:ext>
-            </a:extLst>
-          </p:cNvPr>
-          <p:cNvPicPr>
-            <a:picLocks noChangeAspect="1"/>
-          </p:cNvPicPr>
-          <p:nvPr/>
-        </p:nvPicPr>
-        <p:blipFill>
-          <a:blip r:embed="rId2">
-            <a:extLst>
-              <a:ext uri="{28A0092B-C50C-407E-A947-70E740481C1C}">
-                <a14:useLocalDpi xmlns:a14="http://schemas.microsoft.com/office/drawing/2010/main" val="0"/>
-              </a:ext>
-            </a:extLst>
-          </a:blip>
-          <a:srcRect b="3937"/>
-          <a:stretch/>
-        </p:blipFill>
-        <p:spPr>
-          <a:xfrm>
-            <a:off x="11529438" y="-40519"/>
-            <a:ext cx="10073262" cy="13451719"/>
-          </a:xfrm>
-          <a:prstGeom prst="rect">
-            <a:avLst/>
-          </a:prstGeom>
-        </p:spPr>
-      </p:pic>
-      <p:pic>
-        <p:nvPicPr>
-          <p:cNvPr id="16" name="Picture 15">
-            <a:extLst>
-              <a:ext uri="{FF2B5EF4-FFF2-40B4-BE49-F238E27FC236}">
-                <a16:creationId xmlns:a16="http://schemas.microsoft.com/office/drawing/2014/main" id="{7EAE53B2-E354-515B-4A3E-D41184BBD707}"/>
-              </a:ext>
-            </a:extLst>
-          </p:cNvPr>
-          <p:cNvPicPr>
-            <a:picLocks noChangeAspect="1"/>
-          </p:cNvPicPr>
-          <p:nvPr/>
-        </p:nvPicPr>
-        <p:blipFill>
-          <a:blip r:embed="rId3"/>
-          <a:stretch>
-            <a:fillRect/>
-          </a:stretch>
-        </p:blipFill>
-        <p:spPr>
-          <a:xfrm>
-            <a:off x="21750165" y="9026424"/>
-            <a:ext cx="2562373" cy="4023874"/>
-          </a:xfrm>
-          <a:prstGeom prst="rect">
-            <a:avLst/>
-          </a:prstGeom>
-        </p:spPr>
-      </p:pic>
-      <p:pic>
-        <p:nvPicPr>
-          <p:cNvPr id="14" name="Picture 13">
-            <a:extLst>
-              <a:ext uri="{FF2B5EF4-FFF2-40B4-BE49-F238E27FC236}">
-                <a16:creationId xmlns:a16="http://schemas.microsoft.com/office/drawing/2014/main" id="{8B78FB63-549B-71A8-8EC4-E3B03ECAECCD}"/>
-              </a:ext>
-            </a:extLst>
-          </p:cNvPr>
-          <p:cNvPicPr>
-            <a:picLocks noChangeAspect="1"/>
-          </p:cNvPicPr>
-          <p:nvPr/>
-        </p:nvPicPr>
-        <p:blipFill>
-          <a:blip r:embed="rId4"/>
-          <a:stretch>
-            <a:fillRect/>
-          </a:stretch>
-        </p:blipFill>
-        <p:spPr>
-          <a:xfrm>
-            <a:off x="21740678" y="214597"/>
-            <a:ext cx="2581349" cy="4057767"/>
-          </a:xfrm>
-          <a:prstGeom prst="rect">
-            <a:avLst/>
-          </a:prstGeom>
-        </p:spPr>
-      </p:pic>
       <p:sp>
         <p:nvSpPr>
           <p:cNvPr id="161" name="Semester 1…">
@@ -4340,245 +4379,12 @@
             </a:r>
             <a:r>
               <a:rPr lang="en-IE" dirty="0"/>
-              <a:t>5</a:t>
+              <a:t>6</a:t>
             </a:r>
             <a:endParaRPr dirty="0"/>
           </a:p>
         </p:txBody>
       </p:sp>
-      <p:sp>
-        <p:nvSpPr>
-          <p:cNvPr id="168" name="Arrow">
-            <a:extLst>
-              <a:ext uri="{FF2B5EF4-FFF2-40B4-BE49-F238E27FC236}">
-                <a16:creationId xmlns:a16="http://schemas.microsoft.com/office/drawing/2014/main" id="{03CB000D-533E-E701-7F24-B1B6C94CF58E}"/>
-              </a:ext>
-            </a:extLst>
-          </p:cNvPr>
-          <p:cNvSpPr/>
-          <p:nvPr/>
-        </p:nvSpPr>
-        <p:spPr>
-          <a:xfrm>
-            <a:off x="20421602" y="775919"/>
-            <a:ext cx="1449546" cy="1270001"/>
-          </a:xfrm>
-          <a:custGeom>
-            <a:avLst/>
-            <a:gdLst/>
-            <a:ahLst/>
-            <a:cxnLst>
-              <a:cxn ang="0">
-                <a:pos x="wd2" y="hd2"/>
-              </a:cxn>
-              <a:cxn ang="5400000">
-                <a:pos x="wd2" y="hd2"/>
-              </a:cxn>
-              <a:cxn ang="10800000">
-                <a:pos x="wd2" y="hd2"/>
-              </a:cxn>
-              <a:cxn ang="16200000">
-                <a:pos x="wd2" y="hd2"/>
-              </a:cxn>
-            </a:cxnLst>
-            <a:rect l="0" t="0" r="r" b="b"/>
-            <a:pathLst>
-              <a:path w="21600" h="21600" extrusionOk="0">
-                <a:moveTo>
-                  <a:pt x="14371" y="14256"/>
-                </a:moveTo>
-                <a:lnTo>
-                  <a:pt x="14371" y="21600"/>
-                </a:lnTo>
-                <a:lnTo>
-                  <a:pt x="0" y="10800"/>
-                </a:lnTo>
-                <a:lnTo>
-                  <a:pt x="14371" y="0"/>
-                </a:lnTo>
-                <a:lnTo>
-                  <a:pt x="14371" y="7344"/>
-                </a:lnTo>
-                <a:lnTo>
-                  <a:pt x="21600" y="7344"/>
-                </a:lnTo>
-                <a:lnTo>
-                  <a:pt x="21600" y="14256"/>
-                </a:lnTo>
-                <a:close/>
-              </a:path>
-            </a:pathLst>
-          </a:custGeom>
-          <a:solidFill>
-            <a:schemeClr val="accent3">
-              <a:hueOff val="362282"/>
-              <a:satOff val="31803"/>
-              <a:lumOff val="-18242"/>
-            </a:schemeClr>
-          </a:solidFill>
-          <a:ln w="3175">
-            <a:miter lim="400000"/>
-          </a:ln>
-        </p:spPr>
-        <p:txBody>
-          <a:bodyPr lIns="16073" tIns="16073" rIns="16073" bIns="16073" anchor="ctr"/>
-          <a:lstStyle/>
-          <a:p>
-            <a:pPr defTabSz="825500">
-              <a:defRPr sz="3000">
-                <a:solidFill>
-                  <a:srgbClr val="FFFFFF"/>
-                </a:solidFill>
-                <a:latin typeface="Helvetica Neue Medium"/>
-                <a:ea typeface="Helvetica Neue Medium"/>
-                <a:cs typeface="Helvetica Neue Medium"/>
-                <a:sym typeface="Helvetica Neue Medium"/>
-              </a:defRPr>
-            </a:pPr>
-            <a:endParaRPr/>
-          </a:p>
-        </p:txBody>
-      </p:sp>
-      <p:sp>
-        <p:nvSpPr>
-          <p:cNvPr id="169" name="Arrow">
-            <a:extLst>
-              <a:ext uri="{FF2B5EF4-FFF2-40B4-BE49-F238E27FC236}">
-                <a16:creationId xmlns:a16="http://schemas.microsoft.com/office/drawing/2014/main" id="{99B54E03-2CC0-2A94-CBC1-E821A90EE783}"/>
-              </a:ext>
-            </a:extLst>
-          </p:cNvPr>
-          <p:cNvSpPr/>
-          <p:nvPr/>
-        </p:nvSpPr>
-        <p:spPr>
-          <a:xfrm>
-            <a:off x="20421601" y="10126069"/>
-            <a:ext cx="1643804" cy="1270001"/>
-          </a:xfrm>
-          <a:custGeom>
-            <a:avLst/>
-            <a:gdLst/>
-            <a:ahLst/>
-            <a:cxnLst>
-              <a:cxn ang="0">
-                <a:pos x="wd2" y="hd2"/>
-              </a:cxn>
-              <a:cxn ang="5400000">
-                <a:pos x="wd2" y="hd2"/>
-              </a:cxn>
-              <a:cxn ang="10800000">
-                <a:pos x="wd2" y="hd2"/>
-              </a:cxn>
-              <a:cxn ang="16200000">
-                <a:pos x="wd2" y="hd2"/>
-              </a:cxn>
-            </a:cxnLst>
-            <a:rect l="0" t="0" r="r" b="b"/>
-            <a:pathLst>
-              <a:path w="21600" h="21600" extrusionOk="0">
-                <a:moveTo>
-                  <a:pt x="14371" y="14256"/>
-                </a:moveTo>
-                <a:lnTo>
-                  <a:pt x="14371" y="21600"/>
-                </a:lnTo>
-                <a:lnTo>
-                  <a:pt x="0" y="10800"/>
-                </a:lnTo>
-                <a:lnTo>
-                  <a:pt x="14371" y="0"/>
-                </a:lnTo>
-                <a:lnTo>
-                  <a:pt x="14371" y="7344"/>
-                </a:lnTo>
-                <a:lnTo>
-                  <a:pt x="21600" y="7344"/>
-                </a:lnTo>
-                <a:lnTo>
-                  <a:pt x="21600" y="14256"/>
-                </a:lnTo>
-                <a:close/>
-              </a:path>
-            </a:pathLst>
-          </a:custGeom>
-          <a:solidFill>
-            <a:schemeClr val="accent3">
-              <a:hueOff val="362282"/>
-              <a:satOff val="31803"/>
-              <a:lumOff val="-18242"/>
-            </a:schemeClr>
-          </a:solidFill>
-          <a:ln w="3175">
-            <a:miter lim="400000"/>
-          </a:ln>
-        </p:spPr>
-        <p:txBody>
-          <a:bodyPr lIns="16073" tIns="16073" rIns="16073" bIns="16073" anchor="ctr"/>
-          <a:lstStyle/>
-          <a:p>
-            <a:pPr defTabSz="825500">
-              <a:defRPr sz="3000">
-                <a:solidFill>
-                  <a:srgbClr val="FFFFFF"/>
-                </a:solidFill>
-                <a:latin typeface="Helvetica Neue Medium"/>
-                <a:ea typeface="Helvetica Neue Medium"/>
-                <a:cs typeface="Helvetica Neue Medium"/>
-                <a:sym typeface="Helvetica Neue Medium"/>
-              </a:defRPr>
-            </a:pPr>
-            <a:endParaRPr/>
-          </a:p>
-        </p:txBody>
-      </p:sp>
-      <p:pic>
-        <p:nvPicPr>
-          <p:cNvPr id="2050" name="Picture 2" descr=" Higher Diploma in Computer Science 2024">
-            <a:extLst>
-              <a:ext uri="{FF2B5EF4-FFF2-40B4-BE49-F238E27FC236}">
-                <a16:creationId xmlns:a16="http://schemas.microsoft.com/office/drawing/2014/main" id="{F6DAF8D3-97E8-E7CF-71BB-44BF9F9EC4AB}"/>
-              </a:ext>
-            </a:extLst>
-          </p:cNvPr>
-          <p:cNvPicPr>
-            <a:picLocks noChangeAspect="1" noChangeArrowheads="1"/>
-          </p:cNvPicPr>
-          <p:nvPr/>
-        </p:nvPicPr>
-        <p:blipFill>
-          <a:blip r:embed="rId5">
-            <a:extLst>
-              <a:ext uri="{28A0092B-C50C-407E-A947-70E740481C1C}">
-                <a14:useLocalDpi xmlns:a14="http://schemas.microsoft.com/office/drawing/2010/main" val="0"/>
-              </a:ext>
-            </a:extLst>
-          </a:blip>
-          <a:srcRect/>
-          <a:stretch>
-            <a:fillRect/>
-          </a:stretch>
-        </p:blipFill>
-        <p:spPr bwMode="auto">
-          <a:xfrm>
-            <a:off x="348601" y="4108448"/>
-            <a:ext cx="3871784" cy="3871784"/>
-          </a:xfrm>
-          <a:prstGeom prst="rect">
-            <a:avLst/>
-          </a:prstGeom>
-          <a:noFill/>
-          <a:extLst>
-            <a:ext uri="{909E8E84-426E-40DD-AFC4-6F175D3DCCD1}">
-              <a14:hiddenFill xmlns:a14="http://schemas.microsoft.com/office/drawing/2010/main">
-                <a:solidFill>
-                  <a:srgbClr val="FFFFFF"/>
-                </a:solidFill>
-              </a14:hiddenFill>
-            </a:ext>
-          </a:extLst>
-        </p:spPr>
-      </p:pic>
       <p:pic>
         <p:nvPicPr>
           <p:cNvPr id="5" name="Picture 4">
@@ -4594,7 +4400,7 @@
           <p:nvPr/>
         </p:nvPicPr>
         <p:blipFill>
-          <a:blip r:embed="rId6"/>
+          <a:blip r:embed="rId2"/>
           <a:stretch>
             <a:fillRect/>
           </a:stretch>
@@ -4624,7 +4430,7 @@
           <p:nvPr/>
         </p:nvPicPr>
         <p:blipFill>
-          <a:blip r:embed="rId7"/>
+          <a:blip r:embed="rId3"/>
           <a:stretch>
             <a:fillRect/>
           </a:stretch>
@@ -4654,7 +4460,7 @@
           <p:nvPr/>
         </p:nvPicPr>
         <p:blipFill>
-          <a:blip r:embed="rId8"/>
+          <a:blip r:embed="rId4"/>
           <a:stretch>
             <a:fillRect/>
           </a:stretch>
@@ -4750,12 +4556,333 @@
           </a:p>
         </p:txBody>
       </p:sp>
+      <p:pic>
+        <p:nvPicPr>
+          <p:cNvPr id="6" name="Picture 5">
+            <a:extLst>
+              <a:ext uri="{FF2B5EF4-FFF2-40B4-BE49-F238E27FC236}">
+                <a16:creationId xmlns:a16="http://schemas.microsoft.com/office/drawing/2014/main" id="{28E1C910-8FA1-1798-1458-8695AF1A0DEC}"/>
+              </a:ext>
+            </a:extLst>
+          </p:cNvPr>
+          <p:cNvPicPr>
+            <a:picLocks noChangeAspect="1"/>
+          </p:cNvPicPr>
+          <p:nvPr/>
+        </p:nvPicPr>
+        <p:blipFill>
+          <a:blip r:embed="rId5"/>
+          <a:stretch>
+            <a:fillRect/>
+          </a:stretch>
+        </p:blipFill>
+        <p:spPr>
+          <a:xfrm>
+            <a:off x="12058884" y="1084509"/>
+            <a:ext cx="11976515" cy="10590269"/>
+          </a:xfrm>
+          <a:prstGeom prst="rect">
+            <a:avLst/>
+          </a:prstGeom>
+        </p:spPr>
+      </p:pic>
     </p:spTree>
     <p:extLst>
       <p:ext uri="{BB962C8B-B14F-4D97-AF65-F5344CB8AC3E}">
         <p14:creationId xmlns:p14="http://schemas.microsoft.com/office/powerpoint/2010/main" val="585946080"/>
       </p:ext>
     </p:extLst>
+  </p:cSld>
+  <p:clrMapOvr>
+    <a:masterClrMapping/>
+  </p:clrMapOvr>
+  <p:transition spd="med"/>
+</p:sld>
+</file>
+
+<file path=ppt/slides/slide2.xml><?xml version="1.0" encoding="utf-8"?>
+<p:sld xmlns:a="http://schemas.openxmlformats.org/drawingml/2006/main" xmlns:r="http://schemas.openxmlformats.org/officeDocument/2006/relationships" xmlns:p="http://schemas.openxmlformats.org/presentationml/2006/main">
+  <p:cSld>
+    <p:spTree>
+      <p:nvGrpSpPr>
+        <p:cNvPr id="1" name=""/>
+        <p:cNvGrpSpPr/>
+        <p:nvPr/>
+      </p:nvGrpSpPr>
+      <p:grpSpPr>
+        <a:xfrm>
+          <a:off x="0" y="0"/>
+          <a:ext cx="0" cy="0"/>
+          <a:chOff x="0" y="0"/>
+          <a:chExt cx="0" cy="0"/>
+        </a:xfrm>
+      </p:grpSpPr>
+      <p:sp>
+        <p:nvSpPr>
+          <p:cNvPr id="166" name="01"/>
+          <p:cNvSpPr txBox="1">
+            <a:spLocks noGrp="1"/>
+          </p:cNvSpPr>
+          <p:nvPr>
+            <p:ph type="sldNum" sz="quarter" idx="2"/>
+          </p:nvPr>
+        </p:nvSpPr>
+        <p:spPr>
+          <a:xfrm>
+            <a:off x="23355359" y="12862766"/>
+            <a:ext cx="282678" cy="415875"/>
+          </a:xfrm>
+          <a:prstGeom prst="rect">
+            <a:avLst/>
+          </a:prstGeom>
+          <a:extLst>
+            <a:ext uri="{C572A759-6A51-4108-AA02-DFA0A04FC94B}">
+              <ma14:wrappingTextBoxFlag xmlns:ma14="http://schemas.microsoft.com/office/mac/drawingml/2011/main" xmlns:a14="http://schemas.microsoft.com/office/drawing/2010/main" xmlns:m="http://schemas.openxmlformats.org/officeDocument/2006/math" xmlns="" val="1"/>
+            </a:ext>
+          </a:extLst>
+        </p:spPr>
+        <p:txBody>
+          <a:bodyPr/>
+          <a:lstStyle/>
+          <a:p>
+            <a:fld id="{86CB4B4D-7CA3-9044-876B-883B54F8677D}" type="slidenum">
+              <a:rPr/>
+              <a:t>2</a:t>
+            </a:fld>
+            <a:endParaRPr/>
+          </a:p>
+        </p:txBody>
+      </p:sp>
+      <p:sp>
+        <p:nvSpPr>
+          <p:cNvPr id="167" name="Semester 2 Assessment Schedule"/>
+          <p:cNvSpPr txBox="1">
+            <a:spLocks noGrp="1"/>
+          </p:cNvSpPr>
+          <p:nvPr>
+            <p:ph type="title"/>
+          </p:nvPr>
+        </p:nvSpPr>
+        <p:spPr>
+          <a:xfrm>
+            <a:off x="6744890" y="-778558"/>
+            <a:ext cx="16680657" cy="1964533"/>
+          </a:xfrm>
+          <a:prstGeom prst="rect">
+            <a:avLst/>
+          </a:prstGeom>
+        </p:spPr>
+        <p:txBody>
+          <a:bodyPr/>
+          <a:lstStyle/>
+          <a:p>
+            <a:r>
+              <a:rPr dirty="0"/>
+              <a:t>Semester </a:t>
+            </a:r>
+            <a:r>
+              <a:rPr lang="en-IE" dirty="0"/>
+              <a:t>3</a:t>
+            </a:r>
+            <a:r>
+              <a:rPr dirty="0"/>
+              <a:t> Assessment Schedule	</a:t>
+            </a:r>
+          </a:p>
+        </p:txBody>
+      </p:sp>
+      <p:pic>
+        <p:nvPicPr>
+          <p:cNvPr id="3" name="Picture 2">
+            <a:extLst>
+              <a:ext uri="{FF2B5EF4-FFF2-40B4-BE49-F238E27FC236}">
+                <a16:creationId xmlns:a16="http://schemas.microsoft.com/office/drawing/2014/main" id="{6CDEA04C-1D52-11D4-95EB-8E24D5958439}"/>
+              </a:ext>
+            </a:extLst>
+          </p:cNvPr>
+          <p:cNvPicPr>
+            <a:picLocks noChangeAspect="1"/>
+          </p:cNvPicPr>
+          <p:nvPr/>
+        </p:nvPicPr>
+        <p:blipFill>
+          <a:blip r:embed="rId2"/>
+          <a:stretch>
+            <a:fillRect/>
+          </a:stretch>
+        </p:blipFill>
+        <p:spPr>
+          <a:xfrm>
+            <a:off x="1269287" y="2743200"/>
+            <a:ext cx="21946563" cy="8267700"/>
+          </a:xfrm>
+          <a:prstGeom prst="rect">
+            <a:avLst/>
+          </a:prstGeom>
+        </p:spPr>
+      </p:pic>
+    </p:spTree>
+  </p:cSld>
+  <p:clrMapOvr>
+    <a:masterClrMapping/>
+  </p:clrMapOvr>
+  <p:transition spd="med"/>
+</p:sld>
+</file>
+
+<file path=ppt/slides/slide3.xml><?xml version="1.0" encoding="utf-8"?>
+<p:sld xmlns:a="http://schemas.openxmlformats.org/drawingml/2006/main" xmlns:r="http://schemas.openxmlformats.org/officeDocument/2006/relationships" xmlns:p="http://schemas.openxmlformats.org/presentationml/2006/main">
+  <p:cSld>
+    <p:spTree>
+      <p:nvGrpSpPr>
+        <p:cNvPr id="1" name=""/>
+        <p:cNvGrpSpPr/>
+        <p:nvPr/>
+      </p:nvGrpSpPr>
+      <p:grpSpPr>
+        <a:xfrm>
+          <a:off x="0" y="0"/>
+          <a:ext cx="0" cy="0"/>
+          <a:chOff x="0" y="0"/>
+          <a:chExt cx="0" cy="0"/>
+        </a:xfrm>
+      </p:grpSpPr>
+      <p:sp>
+        <p:nvSpPr>
+          <p:cNvPr id="170" name="Weekly Webinar Schedule"/>
+          <p:cNvSpPr txBox="1">
+            <a:spLocks noGrp="1"/>
+          </p:cNvSpPr>
+          <p:nvPr>
+            <p:ph type="title"/>
+          </p:nvPr>
+        </p:nvSpPr>
+        <p:spPr>
+          <a:xfrm>
+            <a:off x="2480774" y="-636870"/>
+            <a:ext cx="16680657" cy="1964533"/>
+          </a:xfrm>
+          <a:prstGeom prst="rect">
+            <a:avLst/>
+          </a:prstGeom>
+        </p:spPr>
+        <p:txBody>
+          <a:bodyPr/>
+          <a:lstStyle/>
+          <a:p>
+            <a:r>
+              <a:t>Weekly Webinar Schedule</a:t>
+            </a:r>
+          </a:p>
+        </p:txBody>
+      </p:sp>
+      <p:sp>
+        <p:nvSpPr>
+          <p:cNvPr id="171" name="01"/>
+          <p:cNvSpPr txBox="1">
+            <a:spLocks noGrp="1"/>
+          </p:cNvSpPr>
+          <p:nvPr>
+            <p:ph type="sldNum" sz="quarter" idx="2"/>
+          </p:nvPr>
+        </p:nvSpPr>
+        <p:spPr>
+          <a:xfrm>
+            <a:off x="23355359" y="12862766"/>
+            <a:ext cx="282678" cy="415875"/>
+          </a:xfrm>
+          <a:prstGeom prst="rect">
+            <a:avLst/>
+          </a:prstGeom>
+          <a:extLst>
+            <a:ext uri="{C572A759-6A51-4108-AA02-DFA0A04FC94B}">
+              <ma14:wrappingTextBoxFlag xmlns:ma14="http://schemas.microsoft.com/office/mac/drawingml/2011/main" xmlns:a14="http://schemas.microsoft.com/office/drawing/2010/main" xmlns:m="http://schemas.openxmlformats.org/officeDocument/2006/math" xmlns="" val="1"/>
+            </a:ext>
+          </a:extLst>
+        </p:spPr>
+        <p:txBody>
+          <a:bodyPr/>
+          <a:lstStyle/>
+          <a:p>
+            <a:fld id="{86CB4B4D-7CA3-9044-876B-883B54F8677D}" type="slidenum">
+              <a:rPr/>
+              <a:t>3</a:t>
+            </a:fld>
+            <a:endParaRPr/>
+          </a:p>
+        </p:txBody>
+      </p:sp>
+      <p:sp>
+        <p:nvSpPr>
+          <p:cNvPr id="172" name="Rectangle"/>
+          <p:cNvSpPr/>
+          <p:nvPr/>
+        </p:nvSpPr>
+        <p:spPr>
+          <a:xfrm>
+            <a:off x="21060334" y="6695419"/>
+            <a:ext cx="1816070" cy="1964532"/>
+          </a:xfrm>
+          <a:prstGeom prst="rect">
+            <a:avLst/>
+          </a:prstGeom>
+          <a:solidFill>
+            <a:srgbClr val="FFFFFF"/>
+          </a:solidFill>
+          <a:ln w="3175">
+            <a:miter lim="400000"/>
+          </a:ln>
+        </p:spPr>
+        <p:txBody>
+          <a:bodyPr lIns="71437" tIns="71437" rIns="71437" bIns="71437" anchor="ctr"/>
+          <a:lstStyle/>
+          <a:p>
+            <a:pPr defTabSz="821531">
+              <a:defRPr sz="5000">
+                <a:solidFill>
+                  <a:srgbClr val="000000"/>
+                </a:solidFill>
+                <a:latin typeface="Helvetica Neue Light"/>
+                <a:ea typeface="Helvetica Neue Light"/>
+                <a:cs typeface="Helvetica Neue Light"/>
+                <a:sym typeface="Helvetica Neue Light"/>
+              </a:defRPr>
+            </a:pPr>
+            <a:endParaRPr/>
+          </a:p>
+        </p:txBody>
+      </p:sp>
+      <p:pic>
+        <p:nvPicPr>
+          <p:cNvPr id="3" name="Picture 2">
+            <a:extLst>
+              <a:ext uri="{FF2B5EF4-FFF2-40B4-BE49-F238E27FC236}">
+                <a16:creationId xmlns:a16="http://schemas.microsoft.com/office/drawing/2014/main" id="{3DCA8406-1275-7E7E-4AE2-E91FEC3C4C45}"/>
+              </a:ext>
+            </a:extLst>
+          </p:cNvPr>
+          <p:cNvPicPr>
+            <a:picLocks noChangeAspect="1"/>
+          </p:cNvPicPr>
+          <p:nvPr/>
+        </p:nvPicPr>
+        <p:blipFill>
+          <a:blip r:embed="rId2"/>
+          <a:stretch>
+            <a:fillRect/>
+          </a:stretch>
+        </p:blipFill>
+        <p:spPr>
+          <a:xfrm>
+            <a:off x="2209800" y="1904286"/>
+            <a:ext cx="21421689" cy="10630613"/>
+          </a:xfrm>
+          <a:prstGeom prst="rect">
+            <a:avLst/>
+          </a:prstGeom>
+        </p:spPr>
+      </p:pic>
+    </p:spTree>
   </p:cSld>
   <p:clrMapOvr>
     <a:masterClrMapping/>

</xml_diff>

<commit_message>
updated schedule sem32 times ass image
</commit_message>
<xml_diff>
--- a/unit-1-sem-3/calendar.pptx
+++ b/unit-1-sem-3/calendar.pptx
@@ -3455,7 +3455,7 @@
           </a:ln>
           <a:extLst>
             <a:ext uri="{C572A759-6A51-4108-AA02-DFA0A04FC94B}">
-              <ma14:wrappingTextBoxFlag xmlns="" xmlns:m="http://schemas.openxmlformats.org/officeDocument/2006/math" xmlns:a14="http://schemas.microsoft.com/office/drawing/2010/main" xmlns:ma14="http://schemas.microsoft.com/office/mac/drawingml/2011/main" val="1"/>
+              <ma14:wrappingTextBoxFlag xmlns:ma14="http://schemas.microsoft.com/office/mac/drawingml/2011/main" xmlns:a14="http://schemas.microsoft.com/office/drawing/2010/main" xmlns:m="http://schemas.openxmlformats.org/officeDocument/2006/math" xmlns="" val="1"/>
             </a:ext>
           </a:extLst>
         </p:spPr>
@@ -3492,7 +3492,7 @@
           </a:ln>
           <a:extLst>
             <a:ext uri="{C572A759-6A51-4108-AA02-DFA0A04FC94B}">
-              <ma14:wrappingTextBoxFlag xmlns="" xmlns:m="http://schemas.openxmlformats.org/officeDocument/2006/math" xmlns:a14="http://schemas.microsoft.com/office/drawing/2010/main" xmlns:ma14="http://schemas.microsoft.com/office/mac/drawingml/2011/main" val="1"/>
+              <ma14:wrappingTextBoxFlag xmlns:ma14="http://schemas.microsoft.com/office/mac/drawingml/2011/main" xmlns:a14="http://schemas.microsoft.com/office/drawing/2010/main" xmlns:m="http://schemas.openxmlformats.org/officeDocument/2006/math" xmlns="" val="1"/>
             </a:ext>
           </a:extLst>
         </p:spPr>
@@ -4586,6 +4586,42 @@
           </a:prstGeom>
         </p:spPr>
       </p:pic>
+      <p:pic>
+        <p:nvPicPr>
+          <p:cNvPr id="4" name="Picture 3">
+            <a:extLst>
+              <a:ext uri="{FF2B5EF4-FFF2-40B4-BE49-F238E27FC236}">
+                <a16:creationId xmlns:a16="http://schemas.microsoft.com/office/drawing/2014/main" id="{1C7B4A11-C710-A247-3E92-F22D6B96C3E6}"/>
+              </a:ext>
+            </a:extLst>
+          </p:cNvPr>
+          <p:cNvPicPr>
+            <a:picLocks noChangeAspect="1"/>
+          </p:cNvPicPr>
+          <p:nvPr/>
+        </p:nvPicPr>
+        <p:blipFill>
+          <a:blip r:embed="rId6" cstate="print">
+            <a:extLst>
+              <a:ext uri="{28A0092B-C50C-407E-A947-70E740481C1C}">
+                <a14:useLocalDpi xmlns:a14="http://schemas.microsoft.com/office/drawing/2010/main" val="0"/>
+              </a:ext>
+            </a:extLst>
+          </a:blip>
+          <a:stretch>
+            <a:fillRect/>
+          </a:stretch>
+        </p:blipFill>
+        <p:spPr>
+          <a:xfrm>
+            <a:off x="348600" y="1084508"/>
+            <a:ext cx="4090995" cy="4090995"/>
+          </a:xfrm>
+          <a:prstGeom prst="rect">
+            <a:avLst/>
+          </a:prstGeom>
+        </p:spPr>
+      </p:pic>
     </p:spTree>
     <p:extLst>
       <p:ext uri="{BB962C8B-B14F-4D97-AF65-F5344CB8AC3E}">
@@ -4637,7 +4673,7 @@
           </a:prstGeom>
           <a:extLst>
             <a:ext uri="{C572A759-6A51-4108-AA02-DFA0A04FC94B}">
-              <ma14:wrappingTextBoxFlag xmlns:ma14="http://schemas.microsoft.com/office/mac/drawingml/2011/main" xmlns:a14="http://schemas.microsoft.com/office/drawing/2010/main" xmlns:m="http://schemas.openxmlformats.org/officeDocument/2006/math" xmlns="" val="1"/>
+              <ma14:wrappingTextBoxFlag xmlns="" xmlns:m="http://schemas.openxmlformats.org/officeDocument/2006/math" xmlns:a14="http://schemas.microsoft.com/office/drawing/2010/main" xmlns:ma14="http://schemas.microsoft.com/office/mac/drawingml/2011/main" val="1"/>
             </a:ext>
           </a:extLst>
         </p:spPr>
@@ -4796,7 +4832,7 @@
           </a:prstGeom>
           <a:extLst>
             <a:ext uri="{C572A759-6A51-4108-AA02-DFA0A04FC94B}">
-              <ma14:wrappingTextBoxFlag xmlns:ma14="http://schemas.microsoft.com/office/mac/drawingml/2011/main" xmlns:a14="http://schemas.microsoft.com/office/drawing/2010/main" xmlns:m="http://schemas.openxmlformats.org/officeDocument/2006/math" xmlns="" val="1"/>
+              <ma14:wrappingTextBoxFlag xmlns="" xmlns:m="http://schemas.openxmlformats.org/officeDocument/2006/math" xmlns:a14="http://schemas.microsoft.com/office/drawing/2010/main" xmlns:ma14="http://schemas.microsoft.com/office/mac/drawingml/2011/main" val="1"/>
             </a:ext>
           </a:extLst>
         </p:spPr>

</xml_diff>